<commit_message>
Updated files and added more Fortran resources
</commit_message>
<xml_diff>
--- a/Documentation/Charts/Velocity_Stress_FlowChart.pptx
+++ b/Documentation/Charts/Velocity_Stress_FlowChart.pptx
@@ -6,6 +6,7 @@
   </p:sldMasterIdLst>
   <p:sldIdLst>
     <p:sldId id="256" r:id="rId2"/>
+    <p:sldId id="257" r:id="rId3"/>
   </p:sldIdLst>
   <p:sldSz cx="12192000" cy="6858000"/>
   <p:notesSz cx="6858000" cy="9144000"/>
@@ -104,6 +105,11 @@
       </a:defRPr>
     </a:lvl9pPr>
   </p:defaultTextStyle>
+  <p:extLst>
+    <p:ext uri="{EFAFB233-063F-42B5-8137-9DF3F51BA10A}">
+      <p15:sldGuideLst xmlns:p15="http://schemas.microsoft.com/office/powerpoint/2012/main"/>
+    </p:ext>
+  </p:extLst>
 </p:presentation>
 </file>
 
@@ -254,7 +260,7 @@
           <a:p>
             <a:fld id="{EEA10CE3-AC22-4746-A2B4-AA1E40AFC022}" type="datetimeFigureOut">
               <a:rPr lang="en-US" smtClean="0"/>
-              <a:t>12/21/2023</a:t>
+              <a:t>12/26/2023</a:t>
             </a:fld>
             <a:endParaRPr lang="en-US"/>
           </a:p>
@@ -452,7 +458,7 @@
           <a:p>
             <a:fld id="{EEA10CE3-AC22-4746-A2B4-AA1E40AFC022}" type="datetimeFigureOut">
               <a:rPr lang="en-US" smtClean="0"/>
-              <a:t>12/21/2023</a:t>
+              <a:t>12/26/2023</a:t>
             </a:fld>
             <a:endParaRPr lang="en-US"/>
           </a:p>
@@ -660,7 +666,7 @@
           <a:p>
             <a:fld id="{EEA10CE3-AC22-4746-A2B4-AA1E40AFC022}" type="datetimeFigureOut">
               <a:rPr lang="en-US" smtClean="0"/>
-              <a:t>12/21/2023</a:t>
+              <a:t>12/26/2023</a:t>
             </a:fld>
             <a:endParaRPr lang="en-US"/>
           </a:p>
@@ -858,7 +864,7 @@
           <a:p>
             <a:fld id="{EEA10CE3-AC22-4746-A2B4-AA1E40AFC022}" type="datetimeFigureOut">
               <a:rPr lang="en-US" smtClean="0"/>
-              <a:t>12/21/2023</a:t>
+              <a:t>12/26/2023</a:t>
             </a:fld>
             <a:endParaRPr lang="en-US"/>
           </a:p>
@@ -1133,7 +1139,7 @@
           <a:p>
             <a:fld id="{EEA10CE3-AC22-4746-A2B4-AA1E40AFC022}" type="datetimeFigureOut">
               <a:rPr lang="en-US" smtClean="0"/>
-              <a:t>12/21/2023</a:t>
+              <a:t>12/26/2023</a:t>
             </a:fld>
             <a:endParaRPr lang="en-US"/>
           </a:p>
@@ -1398,7 +1404,7 @@
           <a:p>
             <a:fld id="{EEA10CE3-AC22-4746-A2B4-AA1E40AFC022}" type="datetimeFigureOut">
               <a:rPr lang="en-US" smtClean="0"/>
-              <a:t>12/21/2023</a:t>
+              <a:t>12/26/2023</a:t>
             </a:fld>
             <a:endParaRPr lang="en-US"/>
           </a:p>
@@ -1810,7 +1816,7 @@
           <a:p>
             <a:fld id="{EEA10CE3-AC22-4746-A2B4-AA1E40AFC022}" type="datetimeFigureOut">
               <a:rPr lang="en-US" smtClean="0"/>
-              <a:t>12/21/2023</a:t>
+              <a:t>12/26/2023</a:t>
             </a:fld>
             <a:endParaRPr lang="en-US"/>
           </a:p>
@@ -1951,7 +1957,7 @@
           <a:p>
             <a:fld id="{EEA10CE3-AC22-4746-A2B4-AA1E40AFC022}" type="datetimeFigureOut">
               <a:rPr lang="en-US" smtClean="0"/>
-              <a:t>12/21/2023</a:t>
+              <a:t>12/26/2023</a:t>
             </a:fld>
             <a:endParaRPr lang="en-US"/>
           </a:p>
@@ -2064,7 +2070,7 @@
           <a:p>
             <a:fld id="{EEA10CE3-AC22-4746-A2B4-AA1E40AFC022}" type="datetimeFigureOut">
               <a:rPr lang="en-US" smtClean="0"/>
-              <a:t>12/21/2023</a:t>
+              <a:t>12/26/2023</a:t>
             </a:fld>
             <a:endParaRPr lang="en-US"/>
           </a:p>
@@ -2375,7 +2381,7 @@
           <a:p>
             <a:fld id="{EEA10CE3-AC22-4746-A2B4-AA1E40AFC022}" type="datetimeFigureOut">
               <a:rPr lang="en-US" smtClean="0"/>
-              <a:t>12/21/2023</a:t>
+              <a:t>12/26/2023</a:t>
             </a:fld>
             <a:endParaRPr lang="en-US"/>
           </a:p>
@@ -2663,7 +2669,7 @@
           <a:p>
             <a:fld id="{EEA10CE3-AC22-4746-A2B4-AA1E40AFC022}" type="datetimeFigureOut">
               <a:rPr lang="en-US" smtClean="0"/>
-              <a:t>12/21/2023</a:t>
+              <a:t>12/26/2023</a:t>
             </a:fld>
             <a:endParaRPr lang="en-US"/>
           </a:p>
@@ -2904,7 +2910,7 @@
           <a:p>
             <a:fld id="{EEA10CE3-AC22-4746-A2B4-AA1E40AFC022}" type="datetimeFigureOut">
               <a:rPr lang="en-US" smtClean="0"/>
-              <a:t>12/21/2023</a:t>
+              <a:t>12/26/2023</a:t>
             </a:fld>
             <a:endParaRPr lang="en-US"/>
           </a:p>
@@ -3737,7 +3743,7 @@
         </p:nvSpPr>
         <p:spPr>
           <a:xfrm>
-            <a:off x="8418256" y="1081856"/>
+            <a:off x="-888748" y="4939481"/>
             <a:ext cx="2900517" cy="1042219"/>
           </a:xfrm>
           <a:prstGeom prst="rect">
@@ -3771,12 +3777,24 @@
           <a:lstStyle/>
           <a:p>
             <a:pPr algn="ctr"/>
-            <a:endParaRPr lang="en-US" dirty="0">
-              <a:solidFill>
-                <a:schemeClr val="tx1"/>
-              </a:solidFill>
-              <a:latin typeface="+mj-lt"/>
-            </a:endParaRPr>
+            <a:r>
+              <a:rPr lang="en-US" dirty="0" err="1">
+                <a:solidFill>
+                  <a:schemeClr val="tx1"/>
+                </a:solidFill>
+                <a:latin typeface="+mj-lt"/>
+              </a:rPr>
+              <a:t>CheckMinMax</a:t>
+            </a:r>
+            <a:r>
+              <a:rPr lang="en-US" dirty="0">
+                <a:solidFill>
+                  <a:schemeClr val="tx1"/>
+                </a:solidFill>
+                <a:latin typeface="+mj-lt"/>
+              </a:rPr>
+              <a:t>- Subroutine determines the minimum and maximum set of coordinates given a set of coordinates</a:t>
+            </a:r>
           </a:p>
         </p:txBody>
       </p:sp>
@@ -3794,7 +3812,7 @@
         </p:nvSpPr>
         <p:spPr>
           <a:xfrm>
-            <a:off x="9411314" y="3899719"/>
+            <a:off x="9204836" y="3434838"/>
             <a:ext cx="2900517" cy="1042219"/>
           </a:xfrm>
           <a:prstGeom prst="rect">
@@ -3854,7 +3872,7 @@
         </p:nvSpPr>
         <p:spPr>
           <a:xfrm>
-            <a:off x="618662" y="2686050"/>
+            <a:off x="561512" y="2386781"/>
             <a:ext cx="2900517" cy="1042219"/>
           </a:xfrm>
           <a:prstGeom prst="rect">
@@ -3914,7 +3932,7 @@
         </p:nvSpPr>
         <p:spPr>
           <a:xfrm>
-            <a:off x="7149586" y="2686050"/>
+            <a:off x="7808655" y="2137902"/>
             <a:ext cx="2900517" cy="1042219"/>
           </a:xfrm>
           <a:prstGeom prst="rect">
@@ -3974,7 +3992,7 @@
         </p:nvSpPr>
         <p:spPr>
           <a:xfrm>
-            <a:off x="2604320" y="3921532"/>
+            <a:off x="2405290" y="3566342"/>
             <a:ext cx="2900517" cy="1042219"/>
           </a:xfrm>
           <a:prstGeom prst="rect">
@@ -4094,7 +4112,7 @@
         </p:nvSpPr>
         <p:spPr>
           <a:xfrm>
-            <a:off x="6205997" y="3917540"/>
+            <a:off x="6053597" y="3434838"/>
             <a:ext cx="2900517" cy="1042219"/>
           </a:xfrm>
           <a:prstGeom prst="rect">
@@ -4154,7 +4172,7 @@
         </p:nvSpPr>
         <p:spPr>
           <a:xfrm>
-            <a:off x="-600997" y="3899718"/>
+            <a:off x="-888747" y="3566343"/>
             <a:ext cx="2900517" cy="1042219"/>
           </a:xfrm>
           <a:prstGeom prst="rect">
@@ -4200,12 +4218,42 @@
           </a:p>
         </p:txBody>
       </p:sp>
-      <p:sp>
-        <p:nvSpPr>
-          <p:cNvPr id="28" name="Rectangle 27">
-            <a:extLst>
-              <a:ext uri="{FF2B5EF4-FFF2-40B4-BE49-F238E27FC236}">
-                <a16:creationId xmlns:a16="http://schemas.microsoft.com/office/drawing/2014/main" id="{65A9212B-90C5-A882-2982-06FB31B95FAC}"/>
+    </p:spTree>
+    <p:extLst>
+      <p:ext uri="{BB962C8B-B14F-4D97-AF65-F5344CB8AC3E}">
+        <p14:creationId xmlns:p14="http://schemas.microsoft.com/office/powerpoint/2010/main" val="1138701408"/>
+      </p:ext>
+    </p:extLst>
+  </p:cSld>
+  <p:clrMapOvr>
+    <a:masterClrMapping/>
+  </p:clrMapOvr>
+</p:sld>
+</file>
+
+<file path=ppt/slides/slide2.xml><?xml version="1.0" encoding="utf-8"?>
+<p:sld xmlns:a="http://schemas.openxmlformats.org/drawingml/2006/main" xmlns:r="http://schemas.openxmlformats.org/officeDocument/2006/relationships" xmlns:p="http://schemas.openxmlformats.org/presentationml/2006/main">
+  <p:cSld>
+    <p:spTree>
+      <p:nvGrpSpPr>
+        <p:cNvPr id="1" name=""/>
+        <p:cNvGrpSpPr/>
+        <p:nvPr/>
+      </p:nvGrpSpPr>
+      <p:grpSpPr>
+        <a:xfrm>
+          <a:off x="0" y="0"/>
+          <a:ext cx="0" cy="0"/>
+          <a:chOff x="0" y="0"/>
+          <a:chExt cx="0" cy="0"/>
+        </a:xfrm>
+      </p:grpSpPr>
+      <p:sp>
+        <p:nvSpPr>
+          <p:cNvPr id="4" name="Rectangle 3">
+            <a:extLst>
+              <a:ext uri="{FF2B5EF4-FFF2-40B4-BE49-F238E27FC236}">
+                <a16:creationId xmlns:a16="http://schemas.microsoft.com/office/drawing/2014/main" id="{FEA129D8-4DAA-E976-9A9B-C014DC0E0E4E}"/>
               </a:ext>
             </a:extLst>
           </p:cNvPr>
@@ -4214,7 +4262,7 @@
         </p:nvSpPr>
         <p:spPr>
           <a:xfrm>
-            <a:off x="-600998" y="5434781"/>
+            <a:off x="426781" y="114300"/>
             <a:ext cx="2900517" cy="1042219"/>
           </a:xfrm>
           <a:prstGeom prst="rect">
@@ -4248,6 +4296,66 @@
           <a:lstStyle/>
           <a:p>
             <a:pPr algn="ctr"/>
+            <a:r>
+              <a:rPr lang="en-US" dirty="0">
+                <a:solidFill>
+                  <a:schemeClr val="tx1"/>
+                </a:solidFill>
+                <a:latin typeface="+mj-lt"/>
+              </a:rPr>
+              <a:t>Steps to apply velocity and stress correction </a:t>
+            </a:r>
+          </a:p>
+        </p:txBody>
+      </p:sp>
+      <p:sp>
+        <p:nvSpPr>
+          <p:cNvPr id="5" name="Rectangle 4">
+            <a:extLst>
+              <a:ext uri="{FF2B5EF4-FFF2-40B4-BE49-F238E27FC236}">
+                <a16:creationId xmlns:a16="http://schemas.microsoft.com/office/drawing/2014/main" id="{8BC9BA73-937F-F383-E343-A596265697D7}"/>
+              </a:ext>
+            </a:extLst>
+          </p:cNvPr>
+          <p:cNvSpPr/>
+          <p:nvPr/>
+        </p:nvSpPr>
+        <p:spPr>
+          <a:xfrm>
+            <a:off x="8986683" y="1110431"/>
+            <a:ext cx="2900517" cy="1042219"/>
+          </a:xfrm>
+          <a:prstGeom prst="rect">
+            <a:avLst/>
+          </a:prstGeom>
+          <a:solidFill>
+            <a:schemeClr val="accent1">
+              <a:lumMod val="40000"/>
+              <a:lumOff val="60000"/>
+            </a:schemeClr>
+          </a:solidFill>
+        </p:spPr>
+        <p:style>
+          <a:lnRef idx="2">
+            <a:schemeClr val="accent1">
+              <a:shade val="15000"/>
+            </a:schemeClr>
+          </a:lnRef>
+          <a:fillRef idx="1">
+            <a:schemeClr val="accent1"/>
+          </a:fillRef>
+          <a:effectRef idx="0">
+            <a:schemeClr val="accent1"/>
+          </a:effectRef>
+          <a:fontRef idx="minor">
+            <a:schemeClr val="lt1"/>
+          </a:fontRef>
+        </p:style>
+        <p:txBody>
+          <a:bodyPr rtlCol="0" anchor="ctr"/>
+          <a:lstStyle/>
+          <a:p>
+            <a:pPr algn="ctr"/>
             <a:endParaRPr lang="en-US" dirty="0">
               <a:solidFill>
                 <a:schemeClr val="tx1"/>
@@ -4257,10 +4365,618 @@
           </a:p>
         </p:txBody>
       </p:sp>
+      <p:sp>
+        <p:nvSpPr>
+          <p:cNvPr id="6" name="Rectangle 5">
+            <a:extLst>
+              <a:ext uri="{FF2B5EF4-FFF2-40B4-BE49-F238E27FC236}">
+                <a16:creationId xmlns:a16="http://schemas.microsoft.com/office/drawing/2014/main" id="{980ACB1C-202D-EA39-1958-3F809463CC26}"/>
+              </a:ext>
+            </a:extLst>
+          </p:cNvPr>
+          <p:cNvSpPr/>
+          <p:nvPr/>
+        </p:nvSpPr>
+        <p:spPr>
+          <a:xfrm>
+            <a:off x="9139083" y="1262831"/>
+            <a:ext cx="2900517" cy="1042219"/>
+          </a:xfrm>
+          <a:prstGeom prst="rect">
+            <a:avLst/>
+          </a:prstGeom>
+          <a:solidFill>
+            <a:schemeClr val="accent1">
+              <a:lumMod val="40000"/>
+              <a:lumOff val="60000"/>
+            </a:schemeClr>
+          </a:solidFill>
+        </p:spPr>
+        <p:style>
+          <a:lnRef idx="2">
+            <a:schemeClr val="accent1">
+              <a:shade val="15000"/>
+            </a:schemeClr>
+          </a:lnRef>
+          <a:fillRef idx="1">
+            <a:schemeClr val="accent1"/>
+          </a:fillRef>
+          <a:effectRef idx="0">
+            <a:schemeClr val="accent1"/>
+          </a:effectRef>
+          <a:fontRef idx="minor">
+            <a:schemeClr val="lt1"/>
+          </a:fontRef>
+        </p:style>
+        <p:txBody>
+          <a:bodyPr rtlCol="0" anchor="ctr"/>
+          <a:lstStyle/>
+          <a:p>
+            <a:pPr algn="ctr"/>
+            <a:endParaRPr lang="en-US" dirty="0">
+              <a:solidFill>
+                <a:schemeClr val="tx1"/>
+              </a:solidFill>
+              <a:latin typeface="+mj-lt"/>
+            </a:endParaRPr>
+          </a:p>
+        </p:txBody>
+      </p:sp>
+      <p:sp>
+        <p:nvSpPr>
+          <p:cNvPr id="7" name="Rectangle 6">
+            <a:extLst>
+              <a:ext uri="{FF2B5EF4-FFF2-40B4-BE49-F238E27FC236}">
+                <a16:creationId xmlns:a16="http://schemas.microsoft.com/office/drawing/2014/main" id="{5FFAA5E9-A6FF-A9EF-705F-6682C7462835}"/>
+              </a:ext>
+            </a:extLst>
+          </p:cNvPr>
+          <p:cNvSpPr/>
+          <p:nvPr/>
+        </p:nvSpPr>
+        <p:spPr>
+          <a:xfrm>
+            <a:off x="426780" y="1256071"/>
+            <a:ext cx="2900517" cy="1042219"/>
+          </a:xfrm>
+          <a:prstGeom prst="rect">
+            <a:avLst/>
+          </a:prstGeom>
+          <a:solidFill>
+            <a:schemeClr val="accent1">
+              <a:lumMod val="40000"/>
+              <a:lumOff val="60000"/>
+            </a:schemeClr>
+          </a:solidFill>
+        </p:spPr>
+        <p:style>
+          <a:lnRef idx="2">
+            <a:schemeClr val="accent1">
+              <a:shade val="15000"/>
+            </a:schemeClr>
+          </a:lnRef>
+          <a:fillRef idx="1">
+            <a:schemeClr val="accent1"/>
+          </a:fillRef>
+          <a:effectRef idx="0">
+            <a:schemeClr val="accent1"/>
+          </a:effectRef>
+          <a:fontRef idx="minor">
+            <a:schemeClr val="lt1"/>
+          </a:fontRef>
+        </p:style>
+        <p:txBody>
+          <a:bodyPr rtlCol="0" anchor="ctr"/>
+          <a:lstStyle/>
+          <a:p>
+            <a:pPr algn="ctr"/>
+            <a:r>
+              <a:rPr lang="en-US" dirty="0">
+                <a:solidFill>
+                  <a:schemeClr val="tx1"/>
+                </a:solidFill>
+                <a:latin typeface="+mj-lt"/>
+              </a:rPr>
+              <a:t>Check if (stress or velocity scaling flag)</a:t>
+            </a:r>
+          </a:p>
+        </p:txBody>
+      </p:sp>
+      <p:sp>
+        <p:nvSpPr>
+          <p:cNvPr id="8" name="Rectangle 7">
+            <a:extLst>
+              <a:ext uri="{FF2B5EF4-FFF2-40B4-BE49-F238E27FC236}">
+                <a16:creationId xmlns:a16="http://schemas.microsoft.com/office/drawing/2014/main" id="{5A22000C-1CEF-F5B7-9A13-57237FAF30AE}"/>
+              </a:ext>
+            </a:extLst>
+          </p:cNvPr>
+          <p:cNvSpPr/>
+          <p:nvPr/>
+        </p:nvSpPr>
+        <p:spPr>
+          <a:xfrm>
+            <a:off x="9291483" y="1415231"/>
+            <a:ext cx="2900517" cy="1042219"/>
+          </a:xfrm>
+          <a:prstGeom prst="rect">
+            <a:avLst/>
+          </a:prstGeom>
+          <a:solidFill>
+            <a:schemeClr val="accent1">
+              <a:lumMod val="40000"/>
+              <a:lumOff val="60000"/>
+            </a:schemeClr>
+          </a:solidFill>
+        </p:spPr>
+        <p:style>
+          <a:lnRef idx="2">
+            <a:schemeClr val="accent1">
+              <a:shade val="15000"/>
+            </a:schemeClr>
+          </a:lnRef>
+          <a:fillRef idx="1">
+            <a:schemeClr val="accent1"/>
+          </a:fillRef>
+          <a:effectRef idx="0">
+            <a:schemeClr val="accent1"/>
+          </a:effectRef>
+          <a:fontRef idx="minor">
+            <a:schemeClr val="lt1"/>
+          </a:fontRef>
+        </p:style>
+        <p:txBody>
+          <a:bodyPr rtlCol="0" anchor="ctr"/>
+          <a:lstStyle/>
+          <a:p>
+            <a:pPr algn="ctr"/>
+            <a:endParaRPr lang="en-US" dirty="0">
+              <a:solidFill>
+                <a:schemeClr val="tx1"/>
+              </a:solidFill>
+              <a:latin typeface="+mj-lt"/>
+            </a:endParaRPr>
+          </a:p>
+        </p:txBody>
+      </p:sp>
+      <p:sp>
+        <p:nvSpPr>
+          <p:cNvPr id="9" name="Rectangle 8">
+            <a:extLst>
+              <a:ext uri="{FF2B5EF4-FFF2-40B4-BE49-F238E27FC236}">
+                <a16:creationId xmlns:a16="http://schemas.microsoft.com/office/drawing/2014/main" id="{AB3567B5-CC32-C9AF-C5CB-C64A5D30ED75}"/>
+              </a:ext>
+            </a:extLst>
+          </p:cNvPr>
+          <p:cNvSpPr/>
+          <p:nvPr/>
+        </p:nvSpPr>
+        <p:spPr>
+          <a:xfrm>
+            <a:off x="9443883" y="1567631"/>
+            <a:ext cx="2900517" cy="1042219"/>
+          </a:xfrm>
+          <a:prstGeom prst="rect">
+            <a:avLst/>
+          </a:prstGeom>
+          <a:solidFill>
+            <a:schemeClr val="accent1">
+              <a:lumMod val="40000"/>
+              <a:lumOff val="60000"/>
+            </a:schemeClr>
+          </a:solidFill>
+        </p:spPr>
+        <p:style>
+          <a:lnRef idx="2">
+            <a:schemeClr val="accent1">
+              <a:shade val="15000"/>
+            </a:schemeClr>
+          </a:lnRef>
+          <a:fillRef idx="1">
+            <a:schemeClr val="accent1"/>
+          </a:fillRef>
+          <a:effectRef idx="0">
+            <a:schemeClr val="accent1"/>
+          </a:effectRef>
+          <a:fontRef idx="minor">
+            <a:schemeClr val="lt1"/>
+          </a:fontRef>
+        </p:style>
+        <p:txBody>
+          <a:bodyPr rtlCol="0" anchor="ctr"/>
+          <a:lstStyle/>
+          <a:p>
+            <a:pPr algn="ctr"/>
+            <a:endParaRPr lang="en-US" dirty="0">
+              <a:solidFill>
+                <a:schemeClr val="tx1"/>
+              </a:solidFill>
+              <a:latin typeface="+mj-lt"/>
+            </a:endParaRPr>
+          </a:p>
+        </p:txBody>
+      </p:sp>
+      <p:sp>
+        <p:nvSpPr>
+          <p:cNvPr id="10" name="Rectangle 9">
+            <a:extLst>
+              <a:ext uri="{FF2B5EF4-FFF2-40B4-BE49-F238E27FC236}">
+                <a16:creationId xmlns:a16="http://schemas.microsoft.com/office/drawing/2014/main" id="{BB11B150-0E42-37E3-5AD1-F392530D8FD9}"/>
+              </a:ext>
+            </a:extLst>
+          </p:cNvPr>
+          <p:cNvSpPr/>
+          <p:nvPr/>
+        </p:nvSpPr>
+        <p:spPr>
+          <a:xfrm>
+            <a:off x="9596283" y="1720031"/>
+            <a:ext cx="2900517" cy="1042219"/>
+          </a:xfrm>
+          <a:prstGeom prst="rect">
+            <a:avLst/>
+          </a:prstGeom>
+          <a:solidFill>
+            <a:schemeClr val="accent1">
+              <a:lumMod val="40000"/>
+              <a:lumOff val="60000"/>
+            </a:schemeClr>
+          </a:solidFill>
+        </p:spPr>
+        <p:style>
+          <a:lnRef idx="2">
+            <a:schemeClr val="accent1">
+              <a:shade val="15000"/>
+            </a:schemeClr>
+          </a:lnRef>
+          <a:fillRef idx="1">
+            <a:schemeClr val="accent1"/>
+          </a:fillRef>
+          <a:effectRef idx="0">
+            <a:schemeClr val="accent1"/>
+          </a:effectRef>
+          <a:fontRef idx="minor">
+            <a:schemeClr val="lt1"/>
+          </a:fontRef>
+        </p:style>
+        <p:txBody>
+          <a:bodyPr rtlCol="0" anchor="ctr"/>
+          <a:lstStyle/>
+          <a:p>
+            <a:pPr algn="ctr"/>
+            <a:endParaRPr lang="en-US" dirty="0">
+              <a:solidFill>
+                <a:schemeClr val="tx1"/>
+              </a:solidFill>
+              <a:latin typeface="+mj-lt"/>
+            </a:endParaRPr>
+          </a:p>
+        </p:txBody>
+      </p:sp>
+      <p:sp>
+        <p:nvSpPr>
+          <p:cNvPr id="11" name="Rectangle 10">
+            <a:extLst>
+              <a:ext uri="{FF2B5EF4-FFF2-40B4-BE49-F238E27FC236}">
+                <a16:creationId xmlns:a16="http://schemas.microsoft.com/office/drawing/2014/main" id="{9E71BFD8-7CEC-BEDF-DFCA-C4E7F77C16CC}"/>
+              </a:ext>
+            </a:extLst>
+          </p:cNvPr>
+          <p:cNvSpPr/>
+          <p:nvPr/>
+        </p:nvSpPr>
+        <p:spPr>
+          <a:xfrm>
+            <a:off x="3719358" y="1198921"/>
+            <a:ext cx="2900517" cy="1042219"/>
+          </a:xfrm>
+          <a:prstGeom prst="rect">
+            <a:avLst/>
+          </a:prstGeom>
+          <a:solidFill>
+            <a:schemeClr val="accent1">
+              <a:lumMod val="40000"/>
+              <a:lumOff val="60000"/>
+            </a:schemeClr>
+          </a:solidFill>
+        </p:spPr>
+        <p:style>
+          <a:lnRef idx="2">
+            <a:schemeClr val="accent1">
+              <a:shade val="15000"/>
+            </a:schemeClr>
+          </a:lnRef>
+          <a:fillRef idx="1">
+            <a:schemeClr val="accent1"/>
+          </a:fillRef>
+          <a:effectRef idx="0">
+            <a:schemeClr val="accent1"/>
+          </a:effectRef>
+          <a:fontRef idx="minor">
+            <a:schemeClr val="lt1"/>
+          </a:fontRef>
+        </p:style>
+        <p:txBody>
+          <a:bodyPr rtlCol="0" anchor="ctr"/>
+          <a:lstStyle/>
+          <a:p>
+            <a:pPr algn="ctr"/>
+            <a:r>
+              <a:rPr lang="en-US" dirty="0">
+                <a:solidFill>
+                  <a:schemeClr val="tx1"/>
+                </a:solidFill>
+                <a:latin typeface="+mj-lt"/>
+              </a:rPr>
+              <a:t>If (velocity correction)</a:t>
+            </a:r>
+          </a:p>
+          <a:p>
+            <a:pPr algn="ctr"/>
+            <a:r>
+              <a:rPr lang="en-US" dirty="0">
+                <a:solidFill>
+                  <a:schemeClr val="tx1"/>
+                </a:solidFill>
+                <a:latin typeface="+mj-lt"/>
+              </a:rPr>
+              <a:t>Call velocity correction</a:t>
+            </a:r>
+          </a:p>
+          <a:p>
+            <a:pPr algn="ctr"/>
+            <a:r>
+              <a:rPr lang="en-US" dirty="0">
+                <a:solidFill>
+                  <a:schemeClr val="tx1"/>
+                </a:solidFill>
+                <a:latin typeface="+mj-lt"/>
+              </a:rPr>
+              <a:t>If(stress correction)</a:t>
+            </a:r>
+          </a:p>
+          <a:p>
+            <a:pPr algn="ctr"/>
+            <a:r>
+              <a:rPr lang="en-US" dirty="0">
+                <a:solidFill>
+                  <a:schemeClr val="tx1"/>
+                </a:solidFill>
+                <a:latin typeface="+mj-lt"/>
+              </a:rPr>
+              <a:t>Call stress correction</a:t>
+            </a:r>
+          </a:p>
+          <a:p>
+            <a:pPr algn="ctr"/>
+            <a:endParaRPr lang="en-US" dirty="0">
+              <a:solidFill>
+                <a:schemeClr val="tx1"/>
+              </a:solidFill>
+              <a:latin typeface="+mj-lt"/>
+            </a:endParaRPr>
+          </a:p>
+        </p:txBody>
+      </p:sp>
+      <p:sp>
+        <p:nvSpPr>
+          <p:cNvPr id="12" name="Rectangle 11">
+            <a:extLst>
+              <a:ext uri="{FF2B5EF4-FFF2-40B4-BE49-F238E27FC236}">
+                <a16:creationId xmlns:a16="http://schemas.microsoft.com/office/drawing/2014/main" id="{C16CB701-EAA3-7D2B-0B16-D8D72AB9BA1A}"/>
+              </a:ext>
+            </a:extLst>
+          </p:cNvPr>
+          <p:cNvSpPr/>
+          <p:nvPr/>
+        </p:nvSpPr>
+        <p:spPr>
+          <a:xfrm>
+            <a:off x="4398706" y="68212"/>
+            <a:ext cx="2900517" cy="1042219"/>
+          </a:xfrm>
+          <a:prstGeom prst="rect">
+            <a:avLst/>
+          </a:prstGeom>
+          <a:solidFill>
+            <a:schemeClr val="accent1">
+              <a:lumMod val="40000"/>
+              <a:lumOff val="60000"/>
+            </a:schemeClr>
+          </a:solidFill>
+        </p:spPr>
+        <p:style>
+          <a:lnRef idx="2">
+            <a:schemeClr val="accent1">
+              <a:shade val="15000"/>
+            </a:schemeClr>
+          </a:lnRef>
+          <a:fillRef idx="1">
+            <a:schemeClr val="accent1"/>
+          </a:fillRef>
+          <a:effectRef idx="0">
+            <a:schemeClr val="accent1"/>
+          </a:effectRef>
+          <a:fontRef idx="minor">
+            <a:schemeClr val="lt1"/>
+          </a:fontRef>
+        </p:style>
+        <p:txBody>
+          <a:bodyPr rtlCol="0" anchor="ctr"/>
+          <a:lstStyle/>
+          <a:p>
+            <a:pPr algn="ctr"/>
+            <a:r>
+              <a:rPr lang="en-US" dirty="0">
+                <a:solidFill>
+                  <a:schemeClr val="tx1"/>
+                </a:solidFill>
+                <a:latin typeface="+mj-lt"/>
+              </a:rPr>
+              <a:t>Get the MPs in the element</a:t>
+            </a:r>
+          </a:p>
+        </p:txBody>
+      </p:sp>
+      <p:sp>
+        <p:nvSpPr>
+          <p:cNvPr id="13" name="Rectangle 12">
+            <a:extLst>
+              <a:ext uri="{FF2B5EF4-FFF2-40B4-BE49-F238E27FC236}">
+                <a16:creationId xmlns:a16="http://schemas.microsoft.com/office/drawing/2014/main" id="{A57648A4-E6A7-64BB-1643-503EF838818E}"/>
+              </a:ext>
+            </a:extLst>
+          </p:cNvPr>
+          <p:cNvSpPr/>
+          <p:nvPr/>
+        </p:nvSpPr>
+        <p:spPr>
+          <a:xfrm>
+            <a:off x="401893" y="3544836"/>
+            <a:ext cx="2900517" cy="1042219"/>
+          </a:xfrm>
+          <a:prstGeom prst="rect">
+            <a:avLst/>
+          </a:prstGeom>
+          <a:solidFill>
+            <a:schemeClr val="accent1">
+              <a:lumMod val="40000"/>
+              <a:lumOff val="60000"/>
+            </a:schemeClr>
+          </a:solidFill>
+        </p:spPr>
+        <p:style>
+          <a:lnRef idx="2">
+            <a:schemeClr val="accent1">
+              <a:shade val="15000"/>
+            </a:schemeClr>
+          </a:lnRef>
+          <a:fillRef idx="1">
+            <a:schemeClr val="accent1"/>
+          </a:fillRef>
+          <a:effectRef idx="0">
+            <a:schemeClr val="accent1"/>
+          </a:effectRef>
+          <a:fontRef idx="minor">
+            <a:schemeClr val="lt1"/>
+          </a:fontRef>
+        </p:style>
+        <p:txBody>
+          <a:bodyPr rtlCol="0" anchor="ctr"/>
+          <a:lstStyle/>
+          <a:p>
+            <a:pPr algn="ctr"/>
+            <a:r>
+              <a:rPr lang="en-US" dirty="0">
+                <a:solidFill>
+                  <a:schemeClr val="tx1"/>
+                </a:solidFill>
+                <a:latin typeface="+mj-lt"/>
+              </a:rPr>
+              <a:t>Determine the elements in the bounding box</a:t>
+            </a:r>
+          </a:p>
+        </p:txBody>
+      </p:sp>
+      <p:sp>
+        <p:nvSpPr>
+          <p:cNvPr id="14" name="Rectangle 13">
+            <a:extLst>
+              <a:ext uri="{FF2B5EF4-FFF2-40B4-BE49-F238E27FC236}">
+                <a16:creationId xmlns:a16="http://schemas.microsoft.com/office/drawing/2014/main" id="{AA10167E-87AB-49CD-E039-5E59C32662FC}"/>
+              </a:ext>
+            </a:extLst>
+          </p:cNvPr>
+          <p:cNvSpPr/>
+          <p:nvPr/>
+        </p:nvSpPr>
+        <p:spPr>
+          <a:xfrm>
+            <a:off x="401894" y="2403065"/>
+            <a:ext cx="2900517" cy="1042219"/>
+          </a:xfrm>
+          <a:prstGeom prst="rect">
+            <a:avLst/>
+          </a:prstGeom>
+          <a:solidFill>
+            <a:schemeClr val="accent1">
+              <a:lumMod val="40000"/>
+              <a:lumOff val="60000"/>
+            </a:schemeClr>
+          </a:solidFill>
+        </p:spPr>
+        <p:style>
+          <a:lnRef idx="2">
+            <a:schemeClr val="accent1">
+              <a:shade val="15000"/>
+            </a:schemeClr>
+          </a:lnRef>
+          <a:fillRef idx="1">
+            <a:schemeClr val="accent1"/>
+          </a:fillRef>
+          <a:effectRef idx="0">
+            <a:schemeClr val="accent1"/>
+          </a:effectRef>
+          <a:fontRef idx="minor">
+            <a:schemeClr val="lt1"/>
+          </a:fontRef>
+        </p:style>
+        <p:txBody>
+          <a:bodyPr rtlCol="0" anchor="ctr"/>
+          <a:lstStyle/>
+          <a:p>
+            <a:pPr algn="ctr"/>
+            <a:r>
+              <a:rPr lang="en-US" dirty="0">
+                <a:solidFill>
+                  <a:schemeClr val="tx1"/>
+                </a:solidFill>
+                <a:latin typeface="+mj-lt"/>
+              </a:rPr>
+              <a:t>Determine the bounding box </a:t>
+            </a:r>
+          </a:p>
+        </p:txBody>
+      </p:sp>
+      <p:sp>
+        <p:nvSpPr>
+          <p:cNvPr id="15" name="TextBox 14">
+            <a:extLst>
+              <a:ext uri="{FF2B5EF4-FFF2-40B4-BE49-F238E27FC236}">
+                <a16:creationId xmlns:a16="http://schemas.microsoft.com/office/drawing/2014/main" id="{9EAE76C6-C314-B9DD-B5F9-F610C8F5324C}"/>
+              </a:ext>
+            </a:extLst>
+          </p:cNvPr>
+          <p:cNvSpPr txBox="1"/>
+          <p:nvPr/>
+        </p:nvSpPr>
+        <p:spPr>
+          <a:xfrm>
+            <a:off x="7896225" y="114300"/>
+            <a:ext cx="2266950" cy="1200329"/>
+          </a:xfrm>
+          <a:prstGeom prst="rect">
+            <a:avLst/>
+          </a:prstGeom>
+          <a:noFill/>
+        </p:spPr>
+        <p:txBody>
+          <a:bodyPr wrap="square" rtlCol="0">
+            <a:spAutoFit/>
+          </a:bodyPr>
+          <a:lstStyle/>
+          <a:p>
+            <a:r>
+              <a:rPr lang="en-US" dirty="0"/>
+              <a:t>*Assume that the selected nodes could change in subsequent .CPS files</a:t>
+            </a:r>
+          </a:p>
+        </p:txBody>
+      </p:sp>
     </p:spTree>
     <p:extLst>
       <p:ext uri="{BB962C8B-B14F-4D97-AF65-F5344CB8AC3E}">
-        <p14:creationId xmlns:p14="http://schemas.microsoft.com/office/powerpoint/2010/main" val="1138701408"/>
+        <p14:creationId xmlns:p14="http://schemas.microsoft.com/office/powerpoint/2010/main" val="2576603918"/>
       </p:ext>
     </p:extLst>
   </p:cSld>

</xml_diff>